<commit_message>
google maps appears on button click, hashtags added in post page, css added to buttons like/unlike & follow/unfollow, maxlength set to all input fields
</commit_message>
<xml_diff>
--- a/Travelbook.pptx
+++ b/Travelbook.pptx
@@ -6,13 +6,15 @@
   </p:sldMasterIdLst>
   <p:sldIdLst>
     <p:sldId id="256" r:id="rId2"/>
-    <p:sldId id="257" r:id="rId3"/>
-    <p:sldId id="258" r:id="rId4"/>
-    <p:sldId id="262" r:id="rId5"/>
-    <p:sldId id="263" r:id="rId6"/>
-    <p:sldId id="259" r:id="rId7"/>
-    <p:sldId id="260" r:id="rId8"/>
-    <p:sldId id="261" r:id="rId9"/>
+    <p:sldId id="264" r:id="rId3"/>
+    <p:sldId id="265" r:id="rId4"/>
+    <p:sldId id="257" r:id="rId5"/>
+    <p:sldId id="258" r:id="rId6"/>
+    <p:sldId id="262" r:id="rId7"/>
+    <p:sldId id="263" r:id="rId8"/>
+    <p:sldId id="259" r:id="rId9"/>
+    <p:sldId id="260" r:id="rId10"/>
+    <p:sldId id="261" r:id="rId11"/>
   </p:sldIdLst>
   <p:sldSz cx="12192000" cy="6858000"/>
   <p:notesSz cx="6858000" cy="9144000"/>
@@ -111,6 +113,11 @@
       </a:defRPr>
     </a:lvl9pPr>
   </p:defaultTextStyle>
+  <p:extLst>
+    <p:ext uri="{EFAFB233-063F-42B5-8137-9DF3F51BA10A}">
+      <p15:sldGuideLst xmlns:p15="http://schemas.microsoft.com/office/powerpoint/2012/main"/>
+    </p:ext>
+  </p:extLst>
 </p:presentation>
 </file>
 
@@ -651,7 +658,7 @@
           <a:p>
             <a:fld id="{91816728-C71B-4054-A361-55505F1ECE38}" type="datetimeFigureOut">
               <a:rPr lang="bg-BG" smtClean="0"/>
-              <a:t>26.4.2017 г.</a:t>
+              <a:t>27.4.2017 г.</a:t>
             </a:fld>
             <a:endParaRPr lang="bg-BG"/>
           </a:p>
@@ -947,7 +954,7 @@
           <a:p>
             <a:fld id="{91816728-C71B-4054-A361-55505F1ECE38}" type="datetimeFigureOut">
               <a:rPr lang="bg-BG" smtClean="0"/>
-              <a:t>26.4.2017 г.</a:t>
+              <a:t>27.4.2017 г.</a:t>
             </a:fld>
             <a:endParaRPr lang="bg-BG"/>
           </a:p>
@@ -1195,7 +1202,7 @@
           <a:p>
             <a:fld id="{91816728-C71B-4054-A361-55505F1ECE38}" type="datetimeFigureOut">
               <a:rPr lang="bg-BG" smtClean="0"/>
-              <a:t>26.4.2017 г.</a:t>
+              <a:t>27.4.2017 г.</a:t>
             </a:fld>
             <a:endParaRPr lang="bg-BG"/>
           </a:p>
@@ -1735,7 +1742,7 @@
           <a:p>
             <a:fld id="{91816728-C71B-4054-A361-55505F1ECE38}" type="datetimeFigureOut">
               <a:rPr lang="bg-BG" smtClean="0"/>
-              <a:t>26.4.2017 г.</a:t>
+              <a:t>27.4.2017 г.</a:t>
             </a:fld>
             <a:endParaRPr lang="bg-BG"/>
           </a:p>
@@ -1983,7 +1990,7 @@
           <a:p>
             <a:fld id="{91816728-C71B-4054-A361-55505F1ECE38}" type="datetimeFigureOut">
               <a:rPr lang="bg-BG" smtClean="0"/>
-              <a:t>26.4.2017 г.</a:t>
+              <a:t>27.4.2017 г.</a:t>
             </a:fld>
             <a:endParaRPr lang="bg-BG"/>
           </a:p>
@@ -2515,7 +2522,7 @@
           <a:p>
             <a:fld id="{91816728-C71B-4054-A361-55505F1ECE38}" type="datetimeFigureOut">
               <a:rPr lang="bg-BG" smtClean="0"/>
-              <a:t>26.4.2017 г.</a:t>
+              <a:t>27.4.2017 г.</a:t>
             </a:fld>
             <a:endParaRPr lang="bg-BG"/>
           </a:p>
@@ -2812,7 +2819,7 @@
           <a:p>
             <a:fld id="{91816728-C71B-4054-A361-55505F1ECE38}" type="datetimeFigureOut">
               <a:rPr lang="bg-BG" smtClean="0"/>
-              <a:t>26.4.2017 г.</a:t>
+              <a:t>27.4.2017 г.</a:t>
             </a:fld>
             <a:endParaRPr lang="bg-BG"/>
           </a:p>
@@ -2986,7 +2993,7 @@
           <a:p>
             <a:fld id="{91816728-C71B-4054-A361-55505F1ECE38}" type="datetimeFigureOut">
               <a:rPr lang="bg-BG" smtClean="0"/>
-              <a:t>26.4.2017 г.</a:t>
+              <a:t>27.4.2017 г.</a:t>
             </a:fld>
             <a:endParaRPr lang="bg-BG"/>
           </a:p>
@@ -3166,7 +3173,7 @@
           <a:p>
             <a:fld id="{91816728-C71B-4054-A361-55505F1ECE38}" type="datetimeFigureOut">
               <a:rPr lang="bg-BG" smtClean="0"/>
-              <a:t>26.4.2017 г.</a:t>
+              <a:t>27.4.2017 г.</a:t>
             </a:fld>
             <a:endParaRPr lang="bg-BG"/>
           </a:p>
@@ -3336,7 +3343,7 @@
           <a:p>
             <a:fld id="{91816728-C71B-4054-A361-55505F1ECE38}" type="datetimeFigureOut">
               <a:rPr lang="bg-BG" smtClean="0"/>
-              <a:t>26.4.2017 г.</a:t>
+              <a:t>27.4.2017 г.</a:t>
             </a:fld>
             <a:endParaRPr lang="bg-BG"/>
           </a:p>
@@ -3587,7 +3594,7 @@
           <a:p>
             <a:fld id="{91816728-C71B-4054-A361-55505F1ECE38}" type="datetimeFigureOut">
               <a:rPr lang="bg-BG" smtClean="0"/>
-              <a:t>26.4.2017 г.</a:t>
+              <a:t>27.4.2017 г.</a:t>
             </a:fld>
             <a:endParaRPr lang="bg-BG"/>
           </a:p>
@@ -3884,7 +3891,7 @@
           <a:p>
             <a:fld id="{91816728-C71B-4054-A361-55505F1ECE38}" type="datetimeFigureOut">
               <a:rPr lang="bg-BG" smtClean="0"/>
-              <a:t>26.4.2017 г.</a:t>
+              <a:t>27.4.2017 г.</a:t>
             </a:fld>
             <a:endParaRPr lang="bg-BG"/>
           </a:p>
@@ -4326,7 +4333,7 @@
           <a:p>
             <a:fld id="{91816728-C71B-4054-A361-55505F1ECE38}" type="datetimeFigureOut">
               <a:rPr lang="bg-BG" smtClean="0"/>
-              <a:t>26.4.2017 г.</a:t>
+              <a:t>27.4.2017 г.</a:t>
             </a:fld>
             <a:endParaRPr lang="bg-BG"/>
           </a:p>
@@ -4444,7 +4451,7 @@
           <a:p>
             <a:fld id="{91816728-C71B-4054-A361-55505F1ECE38}" type="datetimeFigureOut">
               <a:rPr lang="bg-BG" smtClean="0"/>
-              <a:t>26.4.2017 г.</a:t>
+              <a:t>27.4.2017 г.</a:t>
             </a:fld>
             <a:endParaRPr lang="bg-BG"/>
           </a:p>
@@ -4539,7 +4546,7 @@
           <a:p>
             <a:fld id="{91816728-C71B-4054-A361-55505F1ECE38}" type="datetimeFigureOut">
               <a:rPr lang="bg-BG" smtClean="0"/>
-              <a:t>26.4.2017 г.</a:t>
+              <a:t>27.4.2017 г.</a:t>
             </a:fld>
             <a:endParaRPr lang="bg-BG"/>
           </a:p>
@@ -4822,7 +4829,7 @@
           <a:p>
             <a:fld id="{91816728-C71B-4054-A361-55505F1ECE38}" type="datetimeFigureOut">
               <a:rPr lang="bg-BG" smtClean="0"/>
-              <a:t>26.4.2017 г.</a:t>
+              <a:t>27.4.2017 г.</a:t>
             </a:fld>
             <a:endParaRPr lang="bg-BG"/>
           </a:p>
@@ -5113,7 +5120,7 @@
           <a:p>
             <a:fld id="{91816728-C71B-4054-A361-55505F1ECE38}" type="datetimeFigureOut">
               <a:rPr lang="bg-BG" smtClean="0"/>
-              <a:t>26.4.2017 г.</a:t>
+              <a:t>27.4.2017 г.</a:t>
             </a:fld>
             <a:endParaRPr lang="bg-BG"/>
           </a:p>
@@ -5643,7 +5650,7 @@
           <a:p>
             <a:fld id="{91816728-C71B-4054-A361-55505F1ECE38}" type="datetimeFigureOut">
               <a:rPr lang="bg-BG" smtClean="0"/>
-              <a:t>26.4.2017 г.</a:t>
+              <a:t>27.4.2017 г.</a:t>
             </a:fld>
             <a:endParaRPr lang="bg-BG"/>
           </a:p>
@@ -6223,48 +6230,197 @@
         </p:spPr>
         <p:txBody>
           <a:bodyPr>
-            <a:normAutofit fontScale="85000" lnSpcReduction="20000"/>
+            <a:noAutofit/>
           </a:bodyPr>
           <a:lstStyle/>
           <a:p>
-            <a:endParaRPr lang="en-US" dirty="0"/>
-          </a:p>
-          <a:p>
-            <a:r>
-              <a:rPr lang="en-US" dirty="0"/>
+            <a:endParaRPr lang="en-US" sz="2000" dirty="0"/>
+          </a:p>
+          <a:p>
+            <a:r>
+              <a:rPr lang="en-US" sz="2000" dirty="0"/>
               <a:t>Tsvetina Gramova</a:t>
             </a:r>
           </a:p>
           <a:p>
             <a:r>
-              <a:rPr lang="en-US" dirty="0" err="1"/>
+              <a:rPr lang="en-US" sz="2000" dirty="0" err="1"/>
               <a:t>Kristiyan</a:t>
             </a:r>
             <a:r>
-              <a:rPr lang="en-US" dirty="0"/>
+              <a:rPr lang="en-US" sz="2000" dirty="0"/>
               <a:t> Ivanov</a:t>
             </a:r>
           </a:p>
           <a:p>
             <a:r>
-              <a:rPr lang="en-US" dirty="0"/>
+              <a:rPr lang="en-US" sz="2000" dirty="0"/>
               <a:t>JAVA EE S</a:t>
             </a:r>
             <a:r>
-              <a:rPr lang="en-US" dirty="0">
+              <a:rPr lang="en-US" sz="2000" dirty="0">
                 <a:latin typeface="Times New Roman" panose="02020603050405020304" pitchFamily="18" charset="0"/>
                 <a:cs typeface="Times New Roman" panose="02020603050405020304" pitchFamily="18" charset="0"/>
               </a:rPr>
               <a:t>07</a:t>
             </a:r>
-            <a:endParaRPr lang="bg-BG" dirty="0"/>
-          </a:p>
-        </p:txBody>
-      </p:sp>
+            <a:endParaRPr lang="bg-BG" sz="2000" dirty="0"/>
+          </a:p>
+        </p:txBody>
+      </p:sp>
+      <p:pic>
+        <p:nvPicPr>
+          <p:cNvPr id="5" name="Картина 4"/>
+          <p:cNvPicPr>
+            <a:picLocks noChangeAspect="1"/>
+          </p:cNvPicPr>
+          <p:nvPr/>
+        </p:nvPicPr>
+        <p:blipFill>
+          <a:blip r:embed="rId2">
+            <a:extLst>
+              <a:ext uri="{28A0092B-C50C-407E-A947-70E740481C1C}">
+                <a14:useLocalDpi xmlns:a14="http://schemas.microsoft.com/office/drawing/2010/main" val="0"/>
+              </a:ext>
+            </a:extLst>
+          </a:blip>
+          <a:stretch>
+            <a:fillRect/>
+          </a:stretch>
+        </p:blipFill>
+        <p:spPr>
+          <a:xfrm>
+            <a:off x="0" y="5698127"/>
+            <a:ext cx="2699952" cy="1058273"/>
+          </a:xfrm>
+          <a:prstGeom prst="rect">
+            <a:avLst/>
+          </a:prstGeom>
+        </p:spPr>
+      </p:pic>
     </p:spTree>
     <p:extLst>
       <p:ext uri="{BB962C8B-B14F-4D97-AF65-F5344CB8AC3E}">
         <p14:creationId xmlns:p14="http://schemas.microsoft.com/office/powerpoint/2010/main" val="10405029"/>
+      </p:ext>
+    </p:extLst>
+  </p:cSld>
+  <p:clrMapOvr>
+    <a:masterClrMapping/>
+  </p:clrMapOvr>
+</p:sld>
+</file>
+
+<file path=ppt/slides/slide10.xml><?xml version="1.0" encoding="utf-8"?>
+<p:sld xmlns:a="http://schemas.openxmlformats.org/drawingml/2006/main" xmlns:r="http://schemas.openxmlformats.org/officeDocument/2006/relationships" xmlns:p="http://schemas.openxmlformats.org/presentationml/2006/main">
+  <p:cSld>
+    <p:spTree>
+      <p:nvGrpSpPr>
+        <p:cNvPr id="1" name=""/>
+        <p:cNvGrpSpPr/>
+        <p:nvPr/>
+      </p:nvGrpSpPr>
+      <p:grpSpPr>
+        <a:xfrm>
+          <a:off x="0" y="0"/>
+          <a:ext cx="0" cy="0"/>
+          <a:chOff x="0" y="0"/>
+          <a:chExt cx="0" cy="0"/>
+        </a:xfrm>
+      </p:grpSpPr>
+      <p:pic>
+        <p:nvPicPr>
+          <p:cNvPr id="5" name="Контейнер за съдържание 4"/>
+          <p:cNvPicPr>
+            <a:picLocks noGrp="1" noChangeAspect="1"/>
+          </p:cNvPicPr>
+          <p:nvPr>
+            <p:ph idx="1"/>
+          </p:nvPr>
+        </p:nvPicPr>
+        <p:blipFill>
+          <a:blip r:embed="rId2">
+            <a:extLst>
+              <a:ext uri="{28A0092B-C50C-407E-A947-70E740481C1C}">
+                <a14:useLocalDpi xmlns:a14="http://schemas.microsoft.com/office/drawing/2010/main" val="0"/>
+              </a:ext>
+            </a:extLst>
+          </a:blip>
+          <a:stretch>
+            <a:fillRect/>
+          </a:stretch>
+        </p:blipFill>
+        <p:spPr>
+          <a:xfrm>
+            <a:off x="2313354" y="1853680"/>
+            <a:ext cx="8193203" cy="4096602"/>
+          </a:xfrm>
+        </p:spPr>
+      </p:pic>
+      <p:sp>
+        <p:nvSpPr>
+          <p:cNvPr id="6" name="Текстово поле 5"/>
+          <p:cNvSpPr txBox="1"/>
+          <p:nvPr/>
+        </p:nvSpPr>
+        <p:spPr>
+          <a:xfrm>
+            <a:off x="4509476" y="562708"/>
+            <a:ext cx="5814647" cy="923330"/>
+          </a:xfrm>
+          <a:prstGeom prst="rect">
+            <a:avLst/>
+          </a:prstGeom>
+          <a:noFill/>
+        </p:spPr>
+        <p:txBody>
+          <a:bodyPr wrap="square" rtlCol="0">
+            <a:spAutoFit/>
+          </a:bodyPr>
+          <a:lstStyle/>
+          <a:p>
+            <a:r>
+              <a:rPr lang="en-US" sz="5400" i="1" dirty="0"/>
+              <a:t>Come join us!</a:t>
+            </a:r>
+            <a:endParaRPr lang="bg-BG" sz="5400" i="1" dirty="0"/>
+          </a:p>
+        </p:txBody>
+      </p:sp>
+      <p:pic>
+        <p:nvPicPr>
+          <p:cNvPr id="4" name="Картина 3"/>
+          <p:cNvPicPr>
+            <a:picLocks noChangeAspect="1"/>
+          </p:cNvPicPr>
+          <p:nvPr/>
+        </p:nvPicPr>
+        <p:blipFill>
+          <a:blip r:embed="rId3">
+            <a:extLst>
+              <a:ext uri="{28A0092B-C50C-407E-A947-70E740481C1C}">
+                <a14:useLocalDpi xmlns:a14="http://schemas.microsoft.com/office/drawing/2010/main" val="0"/>
+              </a:ext>
+            </a:extLst>
+          </a:blip>
+          <a:stretch>
+            <a:fillRect/>
+          </a:stretch>
+        </p:blipFill>
+        <p:spPr>
+          <a:xfrm>
+            <a:off x="9769230" y="-33900"/>
+            <a:ext cx="2699952" cy="1058273"/>
+          </a:xfrm>
+          <a:prstGeom prst="rect">
+            <a:avLst/>
+          </a:prstGeom>
+        </p:spPr>
+      </p:pic>
+    </p:spTree>
+    <p:extLst>
+      <p:ext uri="{BB962C8B-B14F-4D97-AF65-F5344CB8AC3E}">
+        <p14:creationId xmlns:p14="http://schemas.microsoft.com/office/powerpoint/2010/main" val="1830274621"/>
       </p:ext>
     </p:extLst>
   </p:cSld>
@@ -6303,109 +6459,117 @@
         </p:nvSpPr>
         <p:spPr>
           <a:xfrm>
-            <a:off x="1351449" y="177800"/>
+            <a:off x="343266" y="-445820"/>
             <a:ext cx="10018713" cy="1752599"/>
           </a:xfrm>
         </p:spPr>
         <p:txBody>
-          <a:bodyPr/>
+          <a:bodyPr>
+            <a:normAutofit/>
+          </a:bodyPr>
           <a:lstStyle/>
           <a:p>
             <a:r>
-              <a:rPr lang="en-US" dirty="0"/>
-              <a:t>What did we do?</a:t>
-            </a:r>
-            <a:endParaRPr lang="bg-BG" dirty="0"/>
-          </a:p>
-        </p:txBody>
-      </p:sp>
-      <p:sp>
-        <p:nvSpPr>
-          <p:cNvPr id="3" name="Контейнер за съдържание 2"/>
-          <p:cNvSpPr>
-            <a:spLocks noGrp="1"/>
-          </p:cNvSpPr>
+              <a:rPr lang="en-US" sz="4800" i="1" dirty="0"/>
+              <a:t>Who are we? </a:t>
+            </a:r>
+            <a:endParaRPr lang="bg-BG" sz="4800" i="1" dirty="0"/>
+          </a:p>
+        </p:txBody>
+      </p:sp>
+      <p:pic>
+        <p:nvPicPr>
+          <p:cNvPr id="5" name="Контейнер за съдържание 4"/>
+          <p:cNvPicPr>
+            <a:picLocks noGrp="1" noChangeAspect="1"/>
+          </p:cNvPicPr>
           <p:nvPr>
             <p:ph idx="1"/>
           </p:nvPr>
-        </p:nvSpPr>
+        </p:nvPicPr>
+        <p:blipFill>
+          <a:blip r:embed="rId2">
+            <a:extLst>
+              <a:ext uri="{28A0092B-C50C-407E-A947-70E740481C1C}">
+                <a14:useLocalDpi xmlns:a14="http://schemas.microsoft.com/office/drawing/2010/main" val="0"/>
+              </a:ext>
+            </a:extLst>
+          </a:blip>
+          <a:stretch>
+            <a:fillRect/>
+          </a:stretch>
+        </p:blipFill>
+        <p:spPr>
+          <a:xfrm rot="702425">
+            <a:off x="6498307" y="1181832"/>
+            <a:ext cx="5602653" cy="4201990"/>
+          </a:xfrm>
+        </p:spPr>
+      </p:pic>
+      <p:pic>
+        <p:nvPicPr>
+          <p:cNvPr id="6" name="Картина 5"/>
+          <p:cNvPicPr>
+            <a:picLocks noChangeAspect="1"/>
+          </p:cNvPicPr>
+          <p:nvPr/>
+        </p:nvPicPr>
+        <p:blipFill>
+          <a:blip r:embed="rId3">
+            <a:extLst>
+              <a:ext uri="{28A0092B-C50C-407E-A947-70E740481C1C}">
+                <a14:useLocalDpi xmlns:a14="http://schemas.microsoft.com/office/drawing/2010/main" val="0"/>
+              </a:ext>
+            </a:extLst>
+          </a:blip>
+          <a:stretch>
+            <a:fillRect/>
+          </a:stretch>
+        </p:blipFill>
         <p:spPr>
           <a:xfrm>
-            <a:off x="1484311" y="2276230"/>
-            <a:ext cx="10018713" cy="3796324"/>
+            <a:off x="9558215" y="0"/>
+            <a:ext cx="2699952" cy="1058273"/>
           </a:xfrm>
+          <a:prstGeom prst="rect">
+            <a:avLst/>
+          </a:prstGeom>
         </p:spPr>
-        <p:txBody>
-          <a:bodyPr>
-            <a:normAutofit fontScale="92500" lnSpcReduction="20000"/>
-          </a:bodyPr>
-          <a:lstStyle/>
-          <a:p>
-            <a:r>
-              <a:rPr lang="en-US" dirty="0"/>
-              <a:t>Login/logout &amp; register</a:t>
-            </a:r>
-          </a:p>
-          <a:p>
-            <a:r>
-              <a:rPr lang="en-US" dirty="0"/>
-              <a:t>Add post with map location, picture and video</a:t>
-            </a:r>
-          </a:p>
-          <a:p>
-            <a:r>
-              <a:rPr lang="en-US" dirty="0"/>
-              <a:t>Comment and like/dislike posts</a:t>
-            </a:r>
-          </a:p>
-          <a:p>
-            <a:r>
-              <a:rPr lang="en-US" dirty="0"/>
-              <a:t>Follow/unfollow users</a:t>
-            </a:r>
-          </a:p>
-          <a:p>
-            <a:r>
-              <a:rPr lang="en-US" dirty="0"/>
-              <a:t>Update profile</a:t>
-            </a:r>
-          </a:p>
-          <a:p>
-            <a:r>
-              <a:rPr lang="en-US" dirty="0"/>
-              <a:t>Forgot password</a:t>
-            </a:r>
-          </a:p>
-          <a:p>
-            <a:r>
-              <a:rPr lang="en-US" dirty="0"/>
-              <a:t>Search posts by tags, destination and author</a:t>
-            </a:r>
-          </a:p>
-          <a:p>
-            <a:r>
-              <a:rPr lang="en-US" dirty="0"/>
-              <a:t>Search user</a:t>
-            </a:r>
-          </a:p>
-          <a:p>
-            <a:r>
-              <a:rPr lang="en-US" dirty="0"/>
-              <a:t>Browse through posts and users</a:t>
-            </a:r>
-          </a:p>
-          <a:p>
-            <a:endParaRPr lang="en-US" dirty="0"/>
-          </a:p>
-          <a:p>
-            <a:endParaRPr lang="en-US" dirty="0"/>
-          </a:p>
-        </p:txBody>
-      </p:sp>
+      </p:pic>
+      <p:pic>
+        <p:nvPicPr>
+          <p:cNvPr id="4" name="Картина 3"/>
+          <p:cNvPicPr>
+            <a:picLocks noChangeAspect="1"/>
+          </p:cNvPicPr>
+          <p:nvPr/>
+        </p:nvPicPr>
+        <p:blipFill>
+          <a:blip r:embed="rId4">
+            <a:extLst>
+              <a:ext uri="{28A0092B-C50C-407E-A947-70E740481C1C}">
+                <a14:useLocalDpi xmlns:a14="http://schemas.microsoft.com/office/drawing/2010/main" val="0"/>
+              </a:ext>
+            </a:extLst>
+          </a:blip>
+          <a:stretch>
+            <a:fillRect/>
+          </a:stretch>
+        </p:blipFill>
+        <p:spPr>
+          <a:xfrm rot="19812341">
+            <a:off x="1302165" y="398601"/>
+            <a:ext cx="3869209" cy="6858000"/>
+          </a:xfrm>
+          <a:prstGeom prst="rect">
+            <a:avLst/>
+          </a:prstGeom>
+        </p:spPr>
+      </p:pic>
     </p:spTree>
     <p:extLst>
       <p:ext uri="{BB962C8B-B14F-4D97-AF65-F5344CB8AC3E}">
-        <p14:creationId xmlns:p14="http://schemas.microsoft.com/office/powerpoint/2010/main" val="398828249"/>
+        <p14:creationId xmlns:p14="http://schemas.microsoft.com/office/powerpoint/2010/main" val="2476121525"/>
       </p:ext>
     </p:extLst>
   </p:cSld>
@@ -6442,114 +6606,84 @@
             <p:ph type="title"/>
           </p:nvPr>
         </p:nvSpPr>
+        <p:spPr/>
+        <p:txBody>
+          <a:bodyPr/>
+          <a:lstStyle/>
+          <a:p>
+            <a:r>
+              <a:rPr lang="en-US" dirty="0"/>
+              <a:t>What did we do?</a:t>
+            </a:r>
+            <a:endParaRPr lang="bg-BG" dirty="0"/>
+          </a:p>
+        </p:txBody>
+      </p:sp>
+      <p:sp>
+        <p:nvSpPr>
+          <p:cNvPr id="3" name="Контейнер за съдържание 2"/>
+          <p:cNvSpPr>
+            <a:spLocks noGrp="1"/>
+          </p:cNvSpPr>
+          <p:nvPr>
+            <p:ph idx="1"/>
+          </p:nvPr>
+        </p:nvSpPr>
         <p:spPr>
           <a:xfrm>
-            <a:off x="1413972" y="0"/>
-            <a:ext cx="10018713" cy="1752599"/>
+            <a:off x="1484310" y="1869830"/>
+            <a:ext cx="10018713" cy="3124201"/>
           </a:xfrm>
         </p:spPr>
         <p:txBody>
           <a:bodyPr/>
           <a:lstStyle/>
           <a:p>
+            <a:pPr marL="0" indent="0" algn="just">
+              <a:buNone/>
+            </a:pPr>
             <a:r>
               <a:rPr lang="en-US" dirty="0"/>
-              <a:t>How we did it? Used technologies:</a:t>
+              <a:t>We developed a social media site for adventurers which combines the functionality of a social media and the convenience of a traveler’s guide. The idea is to help people socialize over their passion to travel sharing their journeys with each other.</a:t>
             </a:r>
             <a:endParaRPr lang="bg-BG" dirty="0"/>
           </a:p>
         </p:txBody>
       </p:sp>
-      <p:sp>
-        <p:nvSpPr>
-          <p:cNvPr id="3" name="Контейнер за съдържание 2"/>
-          <p:cNvSpPr>
-            <a:spLocks noGrp="1"/>
-          </p:cNvSpPr>
-          <p:nvPr>
-            <p:ph idx="1"/>
-          </p:nvPr>
-        </p:nvSpPr>
+      <p:pic>
+        <p:nvPicPr>
+          <p:cNvPr id="4" name="Картина 3"/>
+          <p:cNvPicPr>
+            <a:picLocks noChangeAspect="1"/>
+          </p:cNvPicPr>
+          <p:nvPr/>
+        </p:nvPicPr>
+        <p:blipFill>
+          <a:blip r:embed="rId2">
+            <a:extLst>
+              <a:ext uri="{28A0092B-C50C-407E-A947-70E740481C1C}">
+                <a14:useLocalDpi xmlns:a14="http://schemas.microsoft.com/office/drawing/2010/main" val="0"/>
+              </a:ext>
+            </a:extLst>
+          </a:blip>
+          <a:stretch>
+            <a:fillRect/>
+          </a:stretch>
+        </p:blipFill>
         <p:spPr>
           <a:xfrm>
-            <a:off x="1585910" y="1424352"/>
-            <a:ext cx="10018713" cy="4773248"/>
+            <a:off x="9769231" y="0"/>
+            <a:ext cx="2699952" cy="1058273"/>
           </a:xfrm>
+          <a:prstGeom prst="rect">
+            <a:avLst/>
+          </a:prstGeom>
         </p:spPr>
-        <p:txBody>
-          <a:bodyPr>
-            <a:normAutofit/>
-          </a:bodyPr>
-          <a:lstStyle/>
-          <a:p>
-            <a:r>
-              <a:rPr lang="en-US" dirty="0"/>
-              <a:t>POJO</a:t>
-            </a:r>
-          </a:p>
-          <a:p>
-            <a:r>
-              <a:rPr lang="en-US" dirty="0"/>
-              <a:t>Collections and exceptions</a:t>
-            </a:r>
-          </a:p>
-          <a:p>
-            <a:r>
-              <a:rPr lang="en-US" dirty="0"/>
-              <a:t>Design patterns: DAO &amp; Singleton</a:t>
-            </a:r>
-          </a:p>
-          <a:p>
-            <a:r>
-              <a:rPr lang="en-US" dirty="0"/>
-              <a:t>Object managers (post and user manager)</a:t>
-            </a:r>
-          </a:p>
-          <a:p>
-            <a:r>
-              <a:rPr lang="en-US" dirty="0"/>
-              <a:t>Spring MVC</a:t>
-            </a:r>
-          </a:p>
-          <a:p>
-            <a:r>
-              <a:rPr lang="en-US" dirty="0"/>
-              <a:t>JSP/JSTL</a:t>
-            </a:r>
-          </a:p>
-          <a:p>
-            <a:r>
-              <a:rPr lang="en-US" dirty="0"/>
-              <a:t>HTML/CSS/JavaScript/AJAX</a:t>
-            </a:r>
-          </a:p>
-          <a:p>
-            <a:r>
-              <a:rPr lang="en-US" dirty="0"/>
-              <a:t>VCS - </a:t>
-            </a:r>
-            <a:r>
-              <a:rPr lang="en-US" dirty="0" err="1"/>
-              <a:t>github</a:t>
-            </a:r>
-            <a:endParaRPr lang="en-US" dirty="0"/>
-          </a:p>
-          <a:p>
-            <a:r>
-              <a:rPr lang="en-US" dirty="0"/>
-              <a:t>Email API, Google Maps API</a:t>
-            </a:r>
-            <a:endParaRPr lang="bg-BG" dirty="0"/>
-          </a:p>
-          <a:p>
-            <a:endParaRPr lang="bg-BG" dirty="0"/>
-          </a:p>
-        </p:txBody>
-      </p:sp>
+      </p:pic>
     </p:spTree>
     <p:extLst>
       <p:ext uri="{BB962C8B-B14F-4D97-AF65-F5344CB8AC3E}">
-        <p14:creationId xmlns:p14="http://schemas.microsoft.com/office/powerpoint/2010/main" val="697299182"/>
+        <p14:creationId xmlns:p14="http://schemas.microsoft.com/office/powerpoint/2010/main" val="4026517707"/>
       </p:ext>
     </p:extLst>
   </p:cSld>
@@ -6576,15 +6710,124 @@
           <a:chExt cx="0" cy="0"/>
         </a:xfrm>
       </p:grpSpPr>
+      <p:sp>
+        <p:nvSpPr>
+          <p:cNvPr id="2" name="Заглавие 1"/>
+          <p:cNvSpPr>
+            <a:spLocks noGrp="1"/>
+          </p:cNvSpPr>
+          <p:nvPr>
+            <p:ph type="title"/>
+          </p:nvPr>
+        </p:nvSpPr>
+        <p:spPr>
+          <a:xfrm>
+            <a:off x="1351449" y="177800"/>
+            <a:ext cx="10018713" cy="1752599"/>
+          </a:xfrm>
+        </p:spPr>
+        <p:txBody>
+          <a:bodyPr/>
+          <a:lstStyle/>
+          <a:p>
+            <a:r>
+              <a:rPr lang="en-US" dirty="0"/>
+              <a:t>What does it do?</a:t>
+            </a:r>
+            <a:endParaRPr lang="bg-BG" dirty="0"/>
+          </a:p>
+        </p:txBody>
+      </p:sp>
+      <p:sp>
+        <p:nvSpPr>
+          <p:cNvPr id="3" name="Контейнер за съдържание 2"/>
+          <p:cNvSpPr>
+            <a:spLocks noGrp="1"/>
+          </p:cNvSpPr>
+          <p:nvPr>
+            <p:ph idx="1"/>
+          </p:nvPr>
+        </p:nvSpPr>
+        <p:spPr>
+          <a:xfrm>
+            <a:off x="1484311" y="2276230"/>
+            <a:ext cx="10018713" cy="3796324"/>
+          </a:xfrm>
+        </p:spPr>
+        <p:txBody>
+          <a:bodyPr>
+            <a:normAutofit fontScale="92500" lnSpcReduction="20000"/>
+          </a:bodyPr>
+          <a:lstStyle/>
+          <a:p>
+            <a:r>
+              <a:rPr lang="en-US" dirty="0"/>
+              <a:t>Registering as user with personal information and a profile picture; Logging in/out;</a:t>
+            </a:r>
+          </a:p>
+          <a:p>
+            <a:r>
+              <a:rPr lang="en-US" dirty="0"/>
+              <a:t>Adding post with map location, picture and video;</a:t>
+            </a:r>
+          </a:p>
+          <a:p>
+            <a:r>
+              <a:rPr lang="en-US" dirty="0"/>
+              <a:t>Commenting and liking/disliking posts;</a:t>
+            </a:r>
+          </a:p>
+          <a:p>
+            <a:r>
+              <a:rPr lang="en-US" dirty="0"/>
+              <a:t>Following/unfollowing users and having news feed with followers’ posts;</a:t>
+            </a:r>
+          </a:p>
+          <a:p>
+            <a:r>
+              <a:rPr lang="en-US" dirty="0"/>
+              <a:t>Updating profile;</a:t>
+            </a:r>
+          </a:p>
+          <a:p>
+            <a:r>
+              <a:rPr lang="en-US" dirty="0"/>
+              <a:t>Recovering password;</a:t>
+            </a:r>
+          </a:p>
+          <a:p>
+            <a:r>
+              <a:rPr lang="en-US" dirty="0"/>
+              <a:t>Searching posts by tags, destination and author;</a:t>
+            </a:r>
+          </a:p>
+          <a:p>
+            <a:r>
+              <a:rPr lang="en-US" dirty="0"/>
+              <a:t>Searching users;</a:t>
+            </a:r>
+          </a:p>
+          <a:p>
+            <a:r>
+              <a:rPr lang="en-US" dirty="0"/>
+              <a:t>Browsing through posts and users;</a:t>
+            </a:r>
+          </a:p>
+          <a:p>
+            <a:endParaRPr lang="en-US" dirty="0"/>
+          </a:p>
+          <a:p>
+            <a:endParaRPr lang="en-US" dirty="0"/>
+          </a:p>
+        </p:txBody>
+      </p:sp>
       <p:pic>
         <p:nvPicPr>
-          <p:cNvPr id="5" name="Контейнер за съдържание 4"/>
+          <p:cNvPr id="4" name="Картина 3"/>
           <p:cNvPicPr>
-            <a:picLocks noGrp="1" noChangeAspect="1"/>
+            <a:picLocks noChangeAspect="1"/>
           </p:cNvPicPr>
-          <p:nvPr>
-            <p:ph idx="1"/>
-          </p:nvPr>
+          <p:nvPr/>
         </p:nvPicPr>
         <p:blipFill>
           <a:blip r:embed="rId2">
@@ -6600,15 +6843,18 @@
         </p:blipFill>
         <p:spPr>
           <a:xfrm>
-            <a:off x="2821353" y="148645"/>
-            <a:ext cx="6916616" cy="6709355"/>
+            <a:off x="9492048" y="-4174"/>
+            <a:ext cx="2699952" cy="1058273"/>
           </a:xfrm>
+          <a:prstGeom prst="rect">
+            <a:avLst/>
+          </a:prstGeom>
         </p:spPr>
       </p:pic>
     </p:spTree>
     <p:extLst>
       <p:ext uri="{BB962C8B-B14F-4D97-AF65-F5344CB8AC3E}">
-        <p14:creationId xmlns:p14="http://schemas.microsoft.com/office/powerpoint/2010/main" val="1751958933"/>
+        <p14:creationId xmlns:p14="http://schemas.microsoft.com/office/powerpoint/2010/main" val="398828249"/>
       </p:ext>
     </p:extLst>
   </p:cSld>
@@ -6635,6 +6881,264 @@
           <a:chExt cx="0" cy="0"/>
         </a:xfrm>
       </p:grpSpPr>
+      <p:sp>
+        <p:nvSpPr>
+          <p:cNvPr id="2" name="Заглавие 1"/>
+          <p:cNvSpPr>
+            <a:spLocks noGrp="1"/>
+          </p:cNvSpPr>
+          <p:nvPr>
+            <p:ph type="title"/>
+          </p:nvPr>
+        </p:nvSpPr>
+        <p:spPr>
+          <a:xfrm>
+            <a:off x="1413972" y="0"/>
+            <a:ext cx="10018713" cy="1752599"/>
+          </a:xfrm>
+        </p:spPr>
+        <p:txBody>
+          <a:bodyPr/>
+          <a:lstStyle/>
+          <a:p>
+            <a:r>
+              <a:rPr lang="en-US" dirty="0"/>
+              <a:t>How we did it? Used technologies:</a:t>
+            </a:r>
+            <a:endParaRPr lang="bg-BG" dirty="0"/>
+          </a:p>
+        </p:txBody>
+      </p:sp>
+      <p:sp>
+        <p:nvSpPr>
+          <p:cNvPr id="3" name="Контейнер за съдържание 2"/>
+          <p:cNvSpPr>
+            <a:spLocks noGrp="1"/>
+          </p:cNvSpPr>
+          <p:nvPr>
+            <p:ph idx="1"/>
+          </p:nvPr>
+        </p:nvSpPr>
+        <p:spPr>
+          <a:xfrm>
+            <a:off x="1585910" y="1424352"/>
+            <a:ext cx="10018713" cy="4773248"/>
+          </a:xfrm>
+        </p:spPr>
+        <p:txBody>
+          <a:bodyPr>
+            <a:normAutofit/>
+          </a:bodyPr>
+          <a:lstStyle/>
+          <a:p>
+            <a:r>
+              <a:rPr lang="en-US"/>
+              <a:t>Core java</a:t>
+            </a:r>
+            <a:endParaRPr lang="en-US" dirty="0"/>
+          </a:p>
+          <a:p>
+            <a:r>
+              <a:rPr lang="en-US" dirty="0"/>
+              <a:t>Design patterns: DAO &amp; Singleton</a:t>
+            </a:r>
+          </a:p>
+          <a:p>
+            <a:r>
+              <a:rPr lang="en-US" dirty="0"/>
+              <a:t>Object managers (post and user manager)</a:t>
+            </a:r>
+          </a:p>
+          <a:p>
+            <a:r>
+              <a:rPr lang="en-US" dirty="0"/>
+              <a:t>Spring MVC</a:t>
+            </a:r>
+          </a:p>
+          <a:p>
+            <a:r>
+              <a:rPr lang="en-US" dirty="0"/>
+              <a:t>JSTL</a:t>
+            </a:r>
+          </a:p>
+          <a:p>
+            <a:r>
+              <a:rPr lang="en-US" dirty="0"/>
+              <a:t>HTML/CSS/JavaScript/AJAX</a:t>
+            </a:r>
+          </a:p>
+          <a:p>
+            <a:r>
+              <a:rPr lang="en-US" dirty="0"/>
+              <a:t>VCS - </a:t>
+            </a:r>
+            <a:r>
+              <a:rPr lang="en-US" dirty="0" err="1"/>
+              <a:t>github</a:t>
+            </a:r>
+            <a:endParaRPr lang="en-US" dirty="0"/>
+          </a:p>
+          <a:p>
+            <a:r>
+              <a:rPr lang="en-US" dirty="0"/>
+              <a:t>Email API, Google Maps API</a:t>
+            </a:r>
+            <a:endParaRPr lang="bg-BG" dirty="0"/>
+          </a:p>
+          <a:p>
+            <a:endParaRPr lang="bg-BG" dirty="0"/>
+          </a:p>
+        </p:txBody>
+      </p:sp>
+      <p:pic>
+        <p:nvPicPr>
+          <p:cNvPr id="4" name="Картина 3"/>
+          <p:cNvPicPr>
+            <a:picLocks noChangeAspect="1"/>
+          </p:cNvPicPr>
+          <p:nvPr/>
+        </p:nvPicPr>
+        <p:blipFill>
+          <a:blip r:embed="rId2">
+            <a:extLst>
+              <a:ext uri="{28A0092B-C50C-407E-A947-70E740481C1C}">
+                <a14:useLocalDpi xmlns:a14="http://schemas.microsoft.com/office/drawing/2010/main" val="0"/>
+              </a:ext>
+            </a:extLst>
+          </a:blip>
+          <a:stretch>
+            <a:fillRect/>
+          </a:stretch>
+        </p:blipFill>
+        <p:spPr>
+          <a:xfrm>
+            <a:off x="9691077" y="-142897"/>
+            <a:ext cx="2699952" cy="1058273"/>
+          </a:xfrm>
+          <a:prstGeom prst="rect">
+            <a:avLst/>
+          </a:prstGeom>
+        </p:spPr>
+      </p:pic>
+    </p:spTree>
+    <p:extLst>
+      <p:ext uri="{BB962C8B-B14F-4D97-AF65-F5344CB8AC3E}">
+        <p14:creationId xmlns:p14="http://schemas.microsoft.com/office/powerpoint/2010/main" val="697299182"/>
+      </p:ext>
+    </p:extLst>
+  </p:cSld>
+  <p:clrMapOvr>
+    <a:masterClrMapping/>
+  </p:clrMapOvr>
+</p:sld>
+</file>
+
+<file path=ppt/slides/slide6.xml><?xml version="1.0" encoding="utf-8"?>
+<p:sld xmlns:a="http://schemas.openxmlformats.org/drawingml/2006/main" xmlns:r="http://schemas.openxmlformats.org/officeDocument/2006/relationships" xmlns:p="http://schemas.openxmlformats.org/presentationml/2006/main">
+  <p:cSld>
+    <p:spTree>
+      <p:nvGrpSpPr>
+        <p:cNvPr id="1" name=""/>
+        <p:cNvGrpSpPr/>
+        <p:nvPr/>
+      </p:nvGrpSpPr>
+      <p:grpSpPr>
+        <a:xfrm>
+          <a:off x="0" y="0"/>
+          <a:ext cx="0" cy="0"/>
+          <a:chOff x="0" y="0"/>
+          <a:chExt cx="0" cy="0"/>
+        </a:xfrm>
+      </p:grpSpPr>
+      <p:pic>
+        <p:nvPicPr>
+          <p:cNvPr id="5" name="Контейнер за съдържание 4"/>
+          <p:cNvPicPr>
+            <a:picLocks noGrp="1" noChangeAspect="1"/>
+          </p:cNvPicPr>
+          <p:nvPr>
+            <p:ph idx="1"/>
+          </p:nvPr>
+        </p:nvPicPr>
+        <p:blipFill>
+          <a:blip r:embed="rId2">
+            <a:extLst>
+              <a:ext uri="{28A0092B-C50C-407E-A947-70E740481C1C}">
+                <a14:useLocalDpi xmlns:a14="http://schemas.microsoft.com/office/drawing/2010/main" val="0"/>
+              </a:ext>
+            </a:extLst>
+          </a:blip>
+          <a:stretch>
+            <a:fillRect/>
+          </a:stretch>
+        </p:blipFill>
+        <p:spPr>
+          <a:xfrm>
+            <a:off x="2821353" y="148645"/>
+            <a:ext cx="6916616" cy="6709355"/>
+          </a:xfrm>
+        </p:spPr>
+      </p:pic>
+      <p:pic>
+        <p:nvPicPr>
+          <p:cNvPr id="3" name="Картина 2"/>
+          <p:cNvPicPr>
+            <a:picLocks noChangeAspect="1"/>
+          </p:cNvPicPr>
+          <p:nvPr/>
+        </p:nvPicPr>
+        <p:blipFill>
+          <a:blip r:embed="rId3">
+            <a:extLst>
+              <a:ext uri="{28A0092B-C50C-407E-A947-70E740481C1C}">
+                <a14:useLocalDpi xmlns:a14="http://schemas.microsoft.com/office/drawing/2010/main" val="0"/>
+              </a:ext>
+            </a:extLst>
+          </a:blip>
+          <a:stretch>
+            <a:fillRect/>
+          </a:stretch>
+        </p:blipFill>
+        <p:spPr>
+          <a:xfrm>
+            <a:off x="9644185" y="-69627"/>
+            <a:ext cx="2699952" cy="1058273"/>
+          </a:xfrm>
+          <a:prstGeom prst="rect">
+            <a:avLst/>
+          </a:prstGeom>
+        </p:spPr>
+      </p:pic>
+    </p:spTree>
+    <p:extLst>
+      <p:ext uri="{BB962C8B-B14F-4D97-AF65-F5344CB8AC3E}">
+        <p14:creationId xmlns:p14="http://schemas.microsoft.com/office/powerpoint/2010/main" val="1751958933"/>
+      </p:ext>
+    </p:extLst>
+  </p:cSld>
+  <p:clrMapOvr>
+    <a:masterClrMapping/>
+  </p:clrMapOvr>
+</p:sld>
+</file>
+
+<file path=ppt/slides/slide7.xml><?xml version="1.0" encoding="utf-8"?>
+<p:sld xmlns:a="http://schemas.openxmlformats.org/drawingml/2006/main" xmlns:r="http://schemas.openxmlformats.org/officeDocument/2006/relationships" xmlns:p="http://schemas.openxmlformats.org/presentationml/2006/main">
+  <p:cSld>
+    <p:spTree>
+      <p:nvGrpSpPr>
+        <p:cNvPr id="1" name=""/>
+        <p:cNvGrpSpPr/>
+        <p:nvPr/>
+      </p:nvGrpSpPr>
+      <p:grpSpPr>
+        <a:xfrm>
+          <a:off x="0" y="0"/>
+          <a:ext cx="0" cy="0"/>
+          <a:chOff x="0" y="0"/>
+          <a:chExt cx="0" cy="0"/>
+        </a:xfrm>
+      </p:grpSpPr>
       <p:pic>
         <p:nvPicPr>
           <p:cNvPr id="11" name="Контейнер за съдържание 10"/>
@@ -6664,6 +7168,36 @@
           </a:xfrm>
         </p:spPr>
       </p:pic>
+      <p:pic>
+        <p:nvPicPr>
+          <p:cNvPr id="3" name="Картина 2"/>
+          <p:cNvPicPr>
+            <a:picLocks noChangeAspect="1"/>
+          </p:cNvPicPr>
+          <p:nvPr/>
+        </p:nvPicPr>
+        <p:blipFill>
+          <a:blip r:embed="rId3">
+            <a:extLst>
+              <a:ext uri="{28A0092B-C50C-407E-A947-70E740481C1C}">
+                <a14:useLocalDpi xmlns:a14="http://schemas.microsoft.com/office/drawing/2010/main" val="0"/>
+              </a:ext>
+            </a:extLst>
+          </a:blip>
+          <a:stretch>
+            <a:fillRect/>
+          </a:stretch>
+        </p:blipFill>
+        <p:spPr>
+          <a:xfrm>
+            <a:off x="10113109" y="-132151"/>
+            <a:ext cx="2438399" cy="955755"/>
+          </a:xfrm>
+          <a:prstGeom prst="rect">
+            <a:avLst/>
+          </a:prstGeom>
+        </p:spPr>
+      </p:pic>
     </p:spTree>
     <p:extLst>
       <p:ext uri="{BB962C8B-B14F-4D97-AF65-F5344CB8AC3E}">
@@ -6677,7 +7211,7 @@
 </p:sld>
 </file>
 
-<file path=ppt/slides/slide6.xml><?xml version="1.0" encoding="utf-8"?>
+<file path=ppt/slides/slide8.xml><?xml version="1.0" encoding="utf-8"?>
 <p:sld xmlns:a="http://schemas.openxmlformats.org/drawingml/2006/main" xmlns:r="http://schemas.openxmlformats.org/officeDocument/2006/relationships" xmlns:p="http://schemas.openxmlformats.org/presentationml/2006/main">
   <p:cSld>
     <p:spTree>
@@ -6759,7 +7293,7 @@
 </p:sld>
 </file>
 
-<file path=ppt/slides/slide7.xml><?xml version="1.0" encoding="utf-8"?>
+<file path=ppt/slides/slide9.xml><?xml version="1.0" encoding="utf-8"?>
 <p:sld xmlns:a="http://schemas.openxmlformats.org/drawingml/2006/main" xmlns:r="http://schemas.openxmlformats.org/officeDocument/2006/relationships" xmlns:p="http://schemas.openxmlformats.org/presentationml/2006/main">
   <p:cSld>
     <p:spTree>
@@ -6821,7 +7355,9 @@
           </a:xfrm>
         </p:spPr>
         <p:txBody>
-          <a:bodyPr/>
+          <a:bodyPr>
+            <a:normAutofit lnSpcReduction="10000"/>
+          </a:bodyPr>
           <a:lstStyle/>
           <a:p>
             <a:r>
@@ -6838,13 +7374,25 @@
           <a:p>
             <a:r>
               <a:rPr lang="en-US" dirty="0"/>
-              <a:t>Wish list</a:t>
+              <a:t>Wish list for adding all desired destinations</a:t>
             </a:r>
           </a:p>
           <a:p>
             <a:r>
               <a:rPr lang="en-US" dirty="0"/>
-              <a:t>Messages </a:t>
+              <a:t>Visited destinations</a:t>
+            </a:r>
+          </a:p>
+          <a:p>
+            <a:r>
+              <a:rPr lang="en-US" dirty="0"/>
+              <a:t>Rating posts</a:t>
+            </a:r>
+          </a:p>
+          <a:p>
+            <a:r>
+              <a:rPr lang="en-US" dirty="0"/>
+              <a:t>Messaging other users</a:t>
             </a:r>
           </a:p>
           <a:p>
@@ -6855,51 +7403,20 @@
           </a:p>
           <a:p>
             <a:r>
-              <a:rPr lang="en-US" dirty="0"/>
-              <a:t>Groups </a:t>
-            </a:r>
-          </a:p>
-        </p:txBody>
-      </p:sp>
-    </p:spTree>
-    <p:extLst>
-      <p:ext uri="{BB962C8B-B14F-4D97-AF65-F5344CB8AC3E}">
-        <p14:creationId xmlns:p14="http://schemas.microsoft.com/office/powerpoint/2010/main" val="2564844149"/>
-      </p:ext>
-    </p:extLst>
-  </p:cSld>
-  <p:clrMapOvr>
-    <a:masterClrMapping/>
-  </p:clrMapOvr>
-</p:sld>
-</file>
-
-<file path=ppt/slides/slide8.xml><?xml version="1.0" encoding="utf-8"?>
-<p:sld xmlns:a="http://schemas.openxmlformats.org/drawingml/2006/main" xmlns:r="http://schemas.openxmlformats.org/officeDocument/2006/relationships" xmlns:p="http://schemas.openxmlformats.org/presentationml/2006/main">
-  <p:cSld>
-    <p:spTree>
-      <p:nvGrpSpPr>
-        <p:cNvPr id="1" name=""/>
-        <p:cNvGrpSpPr/>
-        <p:nvPr/>
-      </p:nvGrpSpPr>
-      <p:grpSpPr>
-        <a:xfrm>
-          <a:off x="0" y="0"/>
-          <a:ext cx="0" cy="0"/>
-          <a:chOff x="0" y="0"/>
-          <a:chExt cx="0" cy="0"/>
-        </a:xfrm>
-      </p:grpSpPr>
+              <a:rPr lang="en-US"/>
+              <a:t>Groups</a:t>
+            </a:r>
+            <a:endParaRPr lang="en-US" dirty="0"/>
+          </a:p>
+        </p:txBody>
+      </p:sp>
       <p:pic>
         <p:nvPicPr>
-          <p:cNvPr id="5" name="Контейнер за съдържание 4"/>
+          <p:cNvPr id="4" name="Картина 3"/>
           <p:cNvPicPr>
-            <a:picLocks noGrp="1" noChangeAspect="1"/>
+            <a:picLocks noChangeAspect="1"/>
           </p:cNvPicPr>
-          <p:nvPr>
-            <p:ph idx="1"/>
-          </p:nvPr>
+          <p:nvPr/>
         </p:nvPicPr>
         <p:blipFill>
           <a:blip r:embed="rId2">
@@ -6915,45 +7432,18 @@
         </p:blipFill>
         <p:spPr>
           <a:xfrm>
-            <a:off x="2313354" y="1853680"/>
-            <a:ext cx="8193203" cy="4096602"/>
-          </a:xfrm>
-        </p:spPr>
-      </p:pic>
-      <p:sp>
-        <p:nvSpPr>
-          <p:cNvPr id="6" name="Текстово поле 5"/>
-          <p:cNvSpPr txBox="1"/>
-          <p:nvPr/>
-        </p:nvSpPr>
-        <p:spPr>
-          <a:xfrm>
-            <a:off x="4509476" y="562708"/>
-            <a:ext cx="5814647" cy="923330"/>
+            <a:off x="9675446" y="0"/>
+            <a:ext cx="2699952" cy="1058273"/>
           </a:xfrm>
           <a:prstGeom prst="rect">
             <a:avLst/>
           </a:prstGeom>
-          <a:noFill/>
         </p:spPr>
-        <p:txBody>
-          <a:bodyPr wrap="square" rtlCol="0">
-            <a:spAutoFit/>
-          </a:bodyPr>
-          <a:lstStyle/>
-          <a:p>
-            <a:r>
-              <a:rPr lang="en-US" sz="5400" i="1" dirty="0"/>
-              <a:t>Come join us!</a:t>
-            </a:r>
-            <a:endParaRPr lang="bg-BG" sz="5400" i="1" dirty="0"/>
-          </a:p>
-        </p:txBody>
-      </p:sp>
+      </p:pic>
     </p:spTree>
     <p:extLst>
       <p:ext uri="{BB962C8B-B14F-4D97-AF65-F5344CB8AC3E}">
-        <p14:creationId xmlns:p14="http://schemas.microsoft.com/office/powerpoint/2010/main" val="1830274621"/>
+        <p14:creationId xmlns:p14="http://schemas.microsoft.com/office/powerpoint/2010/main" val="2564844149"/>
       </p:ext>
     </p:extLst>
   </p:cSld>

</xml_diff>